<commit_message>
big changes before submission
</commit_message>
<xml_diff>
--- a/main_matlab_figures/New Microsoft PowerPoint Presentation (2).pptx
+++ b/main_matlab_figures/New Microsoft PowerPoint Presentation (2).pptx
@@ -262,7 +262,7 @@
           <a:p>
             <a:fld id="{8784D0BC-BF7D-4947-B22E-77C205CE6F9F}" type="datetimeFigureOut">
               <a:rPr lang="en-US" smtClean="0"/>
-              <a:t>3/25/2022</a:t>
+              <a:t>11/16/2022</a:t>
             </a:fld>
             <a:endParaRPr lang="en-US"/>
           </a:p>
@@ -460,7 +460,7 @@
           <a:p>
             <a:fld id="{8784D0BC-BF7D-4947-B22E-77C205CE6F9F}" type="datetimeFigureOut">
               <a:rPr lang="en-US" smtClean="0"/>
-              <a:t>3/25/2022</a:t>
+              <a:t>11/16/2022</a:t>
             </a:fld>
             <a:endParaRPr lang="en-US"/>
           </a:p>
@@ -668,7 +668,7 @@
           <a:p>
             <a:fld id="{8784D0BC-BF7D-4947-B22E-77C205CE6F9F}" type="datetimeFigureOut">
               <a:rPr lang="en-US" smtClean="0"/>
-              <a:t>3/25/2022</a:t>
+              <a:t>11/16/2022</a:t>
             </a:fld>
             <a:endParaRPr lang="en-US"/>
           </a:p>
@@ -866,7 +866,7 @@
           <a:p>
             <a:fld id="{8784D0BC-BF7D-4947-B22E-77C205CE6F9F}" type="datetimeFigureOut">
               <a:rPr lang="en-US" smtClean="0"/>
-              <a:t>3/25/2022</a:t>
+              <a:t>11/16/2022</a:t>
             </a:fld>
             <a:endParaRPr lang="en-US"/>
           </a:p>
@@ -1141,7 +1141,7 @@
           <a:p>
             <a:fld id="{8784D0BC-BF7D-4947-B22E-77C205CE6F9F}" type="datetimeFigureOut">
               <a:rPr lang="en-US" smtClean="0"/>
-              <a:t>3/25/2022</a:t>
+              <a:t>11/16/2022</a:t>
             </a:fld>
             <a:endParaRPr lang="en-US"/>
           </a:p>
@@ -1406,7 +1406,7 @@
           <a:p>
             <a:fld id="{8784D0BC-BF7D-4947-B22E-77C205CE6F9F}" type="datetimeFigureOut">
               <a:rPr lang="en-US" smtClean="0"/>
-              <a:t>3/25/2022</a:t>
+              <a:t>11/16/2022</a:t>
             </a:fld>
             <a:endParaRPr lang="en-US"/>
           </a:p>
@@ -1818,7 +1818,7 @@
           <a:p>
             <a:fld id="{8784D0BC-BF7D-4947-B22E-77C205CE6F9F}" type="datetimeFigureOut">
               <a:rPr lang="en-US" smtClean="0"/>
-              <a:t>3/25/2022</a:t>
+              <a:t>11/16/2022</a:t>
             </a:fld>
             <a:endParaRPr lang="en-US"/>
           </a:p>
@@ -1959,7 +1959,7 @@
           <a:p>
             <a:fld id="{8784D0BC-BF7D-4947-B22E-77C205CE6F9F}" type="datetimeFigureOut">
               <a:rPr lang="en-US" smtClean="0"/>
-              <a:t>3/25/2022</a:t>
+              <a:t>11/16/2022</a:t>
             </a:fld>
             <a:endParaRPr lang="en-US"/>
           </a:p>
@@ -2072,7 +2072,7 @@
           <a:p>
             <a:fld id="{8784D0BC-BF7D-4947-B22E-77C205CE6F9F}" type="datetimeFigureOut">
               <a:rPr lang="en-US" smtClean="0"/>
-              <a:t>3/25/2022</a:t>
+              <a:t>11/16/2022</a:t>
             </a:fld>
             <a:endParaRPr lang="en-US"/>
           </a:p>
@@ -2383,7 +2383,7 @@
           <a:p>
             <a:fld id="{8784D0BC-BF7D-4947-B22E-77C205CE6F9F}" type="datetimeFigureOut">
               <a:rPr lang="en-US" smtClean="0"/>
-              <a:t>3/25/2022</a:t>
+              <a:t>11/16/2022</a:t>
             </a:fld>
             <a:endParaRPr lang="en-US"/>
           </a:p>
@@ -2671,7 +2671,7 @@
           <a:p>
             <a:fld id="{8784D0BC-BF7D-4947-B22E-77C205CE6F9F}" type="datetimeFigureOut">
               <a:rPr lang="en-US" smtClean="0"/>
-              <a:t>3/25/2022</a:t>
+              <a:t>11/16/2022</a:t>
             </a:fld>
             <a:endParaRPr lang="en-US"/>
           </a:p>
@@ -2912,7 +2912,7 @@
           <a:p>
             <a:fld id="{8784D0BC-BF7D-4947-B22E-77C205CE6F9F}" type="datetimeFigureOut">
               <a:rPr lang="en-US" smtClean="0"/>
-              <a:t>3/25/2022</a:t>
+              <a:t>11/16/2022</a:t>
             </a:fld>
             <a:endParaRPr lang="en-US"/>
           </a:p>
@@ -18636,8 +18636,8 @@
             </a:p>
           </p:txBody>
         </p:sp>
-        <mc:AlternateContent xmlns:mc="http://schemas.openxmlformats.org/markup-compatibility/2006">
-          <mc:Choice xmlns:a14="http://schemas.microsoft.com/office/drawing/2010/main" Requires="a14">
+        <mc:AlternateContent xmlns:mc="http://schemas.openxmlformats.org/markup-compatibility/2006" xmlns:a14="http://schemas.microsoft.com/office/drawing/2010/main">
+          <mc:Choice Requires="a14">
             <p:sp>
               <p:nvSpPr>
                 <p:cNvPr id="17" name="TextBox 16">
@@ -18734,7 +18734,7 @@
               </p:txBody>
             </p:sp>
           </mc:Choice>
-          <mc:Fallback>
+          <mc:Fallback xmlns="">
             <p:sp>
               <p:nvSpPr>
                 <p:cNvPr id="17" name="TextBox 16">
@@ -18917,18 +18917,6 @@
                       </m:d>
                     </m:oMath>
                   </a14:m>
-                  <a:r>
-                    <a:rPr lang="en-US" sz="1100" b="1" i="1" dirty="0">
-                      <a:solidFill>
-                        <a:schemeClr val="tx1"/>
-                      </a:solidFill>
-                    </a:rPr>
-                    <a:t> </a:t>
-                  </a:r>
-                  <a:r>
-                    <a:rPr lang="en-US" sz="1200" dirty="0"/>
-                    <a:t>in (6)</a:t>
-                  </a:r>
                   <a:endParaRPr lang="en-US" sz="1200" b="1" i="1" dirty="0">
                     <a:solidFill>
                       <a:schemeClr val="tx1"/>
@@ -19138,26 +19126,6 @@
                       </m:r>
                     </m:oMath>
                   </a14:m>
-                  <a:r>
-                    <a:rPr lang="en-US" sz="1200" dirty="0">
-                      <a:solidFill>
-                        <a:schemeClr val="tx1"/>
-                      </a:solidFill>
-                    </a:rPr>
-                    <a:t>in (</a:t>
-                  </a:r>
-                  <a:r>
-                    <a:rPr lang="en-US" sz="1200" dirty="0"/>
-                    <a:t>8</a:t>
-                  </a:r>
-                  <a:r>
-                    <a:rPr lang="en-US" sz="1200" dirty="0">
-                      <a:solidFill>
-                        <a:schemeClr val="tx1"/>
-                      </a:solidFill>
-                    </a:rPr>
-                    <a:t>)</a:t>
-                  </a:r>
                   <a:endParaRPr lang="en-US" sz="1200" b="1" i="1" dirty="0">
                     <a:solidFill>
                       <a:schemeClr val="tx1"/>
@@ -19909,14 +19877,6 @@
                         </m:r>
                       </m:oMath>
                     </a14:m>
-                    <a:r>
-                      <a:rPr lang="en-US" sz="1200" dirty="0">
-                        <a:solidFill>
-                          <a:schemeClr val="tx1"/>
-                        </a:solidFill>
-                      </a:rPr>
-                      <a:t>in (11)</a:t>
-                    </a:r>
                     <a:endParaRPr lang="en-US" sz="1200" b="1" i="1" dirty="0">
                       <a:solidFill>
                         <a:schemeClr val="tx1"/>

</xml_diff>